<commit_message>
update readme et présentation
</commit_message>
<xml_diff>
--- a/Presentation_BeerPass.pptx
+++ b/Presentation_BeerPass.pptx
@@ -695,6 +695,101 @@
 </file>
 
 <file path=ppt/notesSlides/notesSlide3.xml><?xml version="1.0" encoding="utf-8"?>
+<p:notes xmlns:a="http://schemas.openxmlformats.org/drawingml/2006/main" xmlns:r="http://schemas.openxmlformats.org/officeDocument/2006/relationships" xmlns:p="http://schemas.openxmlformats.org/presentationml/2006/main">
+  <p:cSld>
+    <p:spTree>
+      <p:nvGrpSpPr>
+        <p:cNvPr id="1" name=""/>
+        <p:cNvGrpSpPr/>
+        <p:nvPr/>
+      </p:nvGrpSpPr>
+      <p:grpSpPr>
+        <a:xfrm>
+          <a:off x="0" y="0"/>
+          <a:ext cx="0" cy="0"/>
+          <a:chOff x="0" y="0"/>
+          <a:chExt cx="0" cy="0"/>
+        </a:xfrm>
+      </p:grpSpPr>
+      <p:sp>
+        <p:nvSpPr>
+          <p:cNvPr id="2" name="Espace réservé de l'image des diapositives 1"/>
+          <p:cNvSpPr>
+            <a:spLocks noGrp="1" noRot="1" noChangeAspect="1"/>
+          </p:cNvSpPr>
+          <p:nvPr>
+            <p:ph type="sldImg"/>
+          </p:nvPr>
+        </p:nvSpPr>
+        <p:spPr/>
+      </p:sp>
+      <p:sp>
+        <p:nvSpPr>
+          <p:cNvPr id="3" name="Espace réservé des notes 2"/>
+          <p:cNvSpPr>
+            <a:spLocks noGrp="1"/>
+          </p:cNvSpPr>
+          <p:nvPr>
+            <p:ph type="body" idx="1"/>
+          </p:nvPr>
+        </p:nvSpPr>
+        <p:spPr/>
+        <p:txBody>
+          <a:bodyPr/>
+          <a:lstStyle/>
+          <a:p>
+            <a:r>
+              <a:rPr lang="fr-FR" dirty="0"/>
+              <a:t>CRUD sur </a:t>
+            </a:r>
+            <a:r>
+              <a:rPr lang="fr-FR" dirty="0" err="1"/>
+              <a:t>Company</a:t>
+            </a:r>
+            <a:r>
+              <a:rPr lang="fr-FR" dirty="0"/>
+              <a:t> inclut CRUD sur horaires et adresse</a:t>
+            </a:r>
+          </a:p>
+        </p:txBody>
+      </p:sp>
+      <p:sp>
+        <p:nvSpPr>
+          <p:cNvPr id="4" name="Espace réservé du numéro de diapositive 3"/>
+          <p:cNvSpPr>
+            <a:spLocks noGrp="1"/>
+          </p:cNvSpPr>
+          <p:nvPr>
+            <p:ph type="sldNum" sz="quarter" idx="5"/>
+          </p:nvPr>
+        </p:nvSpPr>
+        <p:spPr/>
+        <p:txBody>
+          <a:bodyPr/>
+          <a:lstStyle/>
+          <a:p>
+            <a:fld id="{FF63ADC1-16D8-FB4C-A8FA-1934EF2E6464}" type="slidenum">
+              <a:rPr lang="fr-FR" smtClean="0"/>
+              <a:t>6</a:t>
+            </a:fld>
+            <a:endParaRPr lang="fr-FR"/>
+          </a:p>
+        </p:txBody>
+      </p:sp>
+    </p:spTree>
+    <p:extLst>
+      <p:ext uri="{BB962C8B-B14F-4D97-AF65-F5344CB8AC3E}">
+        <p14:creationId xmlns:p14="http://schemas.microsoft.com/office/powerpoint/2010/main" val="955058084"/>
+      </p:ext>
+    </p:extLst>
+  </p:cSld>
+  <p:clrMapOvr>
+    <a:masterClrMapping/>
+  </p:clrMapOvr>
+</p:notes>
+</file>
+
+<file path=ppt/notesSlides/notesSlide4.xml><?xml version="1.0" encoding="utf-8"?>
 <p:notes xmlns:a="http://schemas.openxmlformats.org/drawingml/2006/main" xmlns:r="http://schemas.openxmlformats.org/officeDocument/2006/relationships" xmlns:p="http://schemas.openxmlformats.org/presentationml/2006/main">
   <p:cSld>
     <p:spTree>
@@ -9264,10 +9359,10 @@
       </p:sp>
       <p:pic>
         <p:nvPicPr>
-          <p:cNvPr id="5" name="Image 4" descr="Une image contenant capture d’écran&#10;&#10;Description générée automatiquement">
+          <p:cNvPr id="4" name="Image 3" descr="Une image contenant capture d’écran&#10;&#10;Description générée automatiquement">
             <a:extLst>
               <a:ext uri="{FF2B5EF4-FFF2-40B4-BE49-F238E27FC236}">
-                <a16:creationId xmlns:a16="http://schemas.microsoft.com/office/drawing/2014/main" id="{45C6818B-A74C-EB4D-9DBB-08B9AB179417}"/>
+                <a16:creationId xmlns:a16="http://schemas.microsoft.com/office/drawing/2014/main" id="{66FD0211-8BEB-D947-8592-D594569DAB48}"/>
               </a:ext>
             </a:extLst>
           </p:cNvPr>

</xml_diff>